<commit_message>
Added slide on Kaggle
</commit_message>
<xml_diff>
--- a/Misc/Python4ML/Python4ML.pptx
+++ b/Misc/Python4ML/Python4ML.pptx
@@ -15,7 +15,8 @@
     <p:sldId id="263" r:id="rId9"/>
     <p:sldId id="265" r:id="rId10"/>
     <p:sldId id="266" r:id="rId11"/>
-    <p:sldId id="264" r:id="rId12"/>
+    <p:sldId id="268" r:id="rId12"/>
+    <p:sldId id="264" r:id="rId13"/>
   </p:sldIdLst>
   <p:sldSz cx="12192000" cy="6858000"/>
   <p:notesSz cx="6858000" cy="9144000"/>
@@ -352,7 +353,7 @@
           <a:p>
             <a:fld id="{8F40E0DB-8359-4A5E-B813-EC9A9793C6FC}" type="datetimeFigureOut">
               <a:rPr lang="en-US" smtClean="0"/>
-              <a:t>1/27/2018</a:t>
+              <a:t>1/29/2018</a:t>
             </a:fld>
             <a:endParaRPr lang="en-US"/>
           </a:p>
@@ -560,7 +561,7 @@
           <a:p>
             <a:fld id="{8F40E0DB-8359-4A5E-B813-EC9A9793C6FC}" type="datetimeFigureOut">
               <a:rPr lang="en-US" smtClean="0"/>
-              <a:t>1/27/2018</a:t>
+              <a:t>1/29/2018</a:t>
             </a:fld>
             <a:endParaRPr lang="en-US"/>
           </a:p>
@@ -816,7 +817,7 @@
           <a:p>
             <a:fld id="{8F40E0DB-8359-4A5E-B813-EC9A9793C6FC}" type="datetimeFigureOut">
               <a:rPr lang="en-US" smtClean="0"/>
-              <a:t>1/27/2018</a:t>
+              <a:t>1/29/2018</a:t>
             </a:fld>
             <a:endParaRPr lang="en-US"/>
           </a:p>
@@ -990,7 +991,7 @@
           <a:p>
             <a:fld id="{8F40E0DB-8359-4A5E-B813-EC9A9793C6FC}" type="datetimeFigureOut">
               <a:rPr lang="en-US" smtClean="0"/>
-              <a:t>1/27/2018</a:t>
+              <a:t>1/29/2018</a:t>
             </a:fld>
             <a:endParaRPr lang="en-US"/>
           </a:p>
@@ -1333,7 +1334,7 @@
           <a:p>
             <a:fld id="{8F40E0DB-8359-4A5E-B813-EC9A9793C6FC}" type="datetimeFigureOut">
               <a:rPr lang="en-US" smtClean="0"/>
-              <a:t>1/27/2018</a:t>
+              <a:t>1/29/2018</a:t>
             </a:fld>
             <a:endParaRPr lang="en-US"/>
           </a:p>
@@ -1608,7 +1609,7 @@
           <a:p>
             <a:fld id="{8F40E0DB-8359-4A5E-B813-EC9A9793C6FC}" type="datetimeFigureOut">
               <a:rPr lang="en-US" smtClean="0"/>
-              <a:t>1/27/2018</a:t>
+              <a:t>1/29/2018</a:t>
             </a:fld>
             <a:endParaRPr lang="en-US"/>
           </a:p>
@@ -1987,7 +1988,7 @@
           <a:p>
             <a:fld id="{8F40E0DB-8359-4A5E-B813-EC9A9793C6FC}" type="datetimeFigureOut">
               <a:rPr lang="en-US" smtClean="0"/>
-              <a:t>1/27/2018</a:t>
+              <a:t>1/29/2018</a:t>
             </a:fld>
             <a:endParaRPr lang="en-US"/>
           </a:p>
@@ -2105,7 +2106,7 @@
           <a:p>
             <a:fld id="{8F40E0DB-8359-4A5E-B813-EC9A9793C6FC}" type="datetimeFigureOut">
               <a:rPr lang="en-US" smtClean="0"/>
-              <a:t>1/27/2018</a:t>
+              <a:t>1/29/2018</a:t>
             </a:fld>
             <a:endParaRPr lang="en-US"/>
           </a:p>
@@ -2276,7 +2277,7 @@
           <a:p>
             <a:fld id="{8F40E0DB-8359-4A5E-B813-EC9A9793C6FC}" type="datetimeFigureOut">
               <a:rPr lang="en-US" smtClean="0"/>
-              <a:t>1/27/2018</a:t>
+              <a:t>1/29/2018</a:t>
             </a:fld>
             <a:endParaRPr lang="en-US"/>
           </a:p>
@@ -2630,7 +2631,7 @@
           <a:p>
             <a:fld id="{8F40E0DB-8359-4A5E-B813-EC9A9793C6FC}" type="datetimeFigureOut">
               <a:rPr lang="en-US" smtClean="0"/>
-              <a:t>1/27/2018</a:t>
+              <a:t>1/29/2018</a:t>
             </a:fld>
             <a:endParaRPr lang="en-US"/>
           </a:p>
@@ -3012,7 +3013,7 @@
           <a:p>
             <a:fld id="{8F40E0DB-8359-4A5E-B813-EC9A9793C6FC}" type="datetimeFigureOut">
               <a:rPr lang="en-US" smtClean="0"/>
-              <a:t>1/27/2018</a:t>
+              <a:t>1/29/2018</a:t>
             </a:fld>
             <a:endParaRPr lang="en-US"/>
           </a:p>
@@ -3299,7 +3300,7 @@
           <a:p>
             <a:fld id="{8F40E0DB-8359-4A5E-B813-EC9A9793C6FC}" type="datetimeFigureOut">
               <a:rPr lang="en-US" smtClean="0"/>
-              <a:t>1/27/2018</a:t>
+              <a:t>1/29/2018</a:t>
             </a:fld>
             <a:endParaRPr lang="en-US"/>
           </a:p>
@@ -4163,6 +4164,169 @@
           <a:p>
             <a:r>
               <a:rPr lang="en-US" dirty="0"/>
+              <a:t>Kaggle</a:t>
+            </a:r>
+          </a:p>
+        </p:txBody>
+      </p:sp>
+      <p:sp>
+        <p:nvSpPr>
+          <p:cNvPr id="3" name="Content Placeholder 2">
+            <a:extLst>
+              <a:ext uri="{FF2B5EF4-FFF2-40B4-BE49-F238E27FC236}">
+                <a16:creationId xmlns:a16="http://schemas.microsoft.com/office/drawing/2014/main" id="{AC38291C-F7E0-45D1-A315-C37CE32EF186}"/>
+              </a:ext>
+            </a:extLst>
+          </p:cNvPr>
+          <p:cNvSpPr>
+            <a:spLocks noGrp="1"/>
+          </p:cNvSpPr>
+          <p:nvPr>
+            <p:ph idx="1"/>
+          </p:nvPr>
+        </p:nvSpPr>
+        <p:spPr>
+          <a:xfrm>
+            <a:off x="1097280" y="1845733"/>
+            <a:ext cx="10058400" cy="4275367"/>
+          </a:xfrm>
+        </p:spPr>
+        <p:txBody>
+          <a:bodyPr>
+            <a:normAutofit/>
+          </a:bodyPr>
+          <a:lstStyle/>
+          <a:p>
+            <a:r>
+              <a:rPr lang="en-US" dirty="0"/>
+              <a:t>For those of you still looking for a project, Kaggle is a great place for ideas and inspiration</a:t>
+            </a:r>
+          </a:p>
+          <a:p>
+            <a:r>
+              <a:rPr lang="en-US" dirty="0"/>
+              <a:t>Competitions</a:t>
+            </a:r>
+          </a:p>
+          <a:p>
+            <a:pPr lvl="1"/>
+            <a:r>
+              <a:rPr lang="en-US" dirty="0"/>
+              <a:t>Real companies post their data problems on Kaggle, the best solutions are awarded prize money</a:t>
+            </a:r>
+          </a:p>
+          <a:p>
+            <a:r>
+              <a:rPr lang="en-US" dirty="0"/>
+              <a:t>Datasets</a:t>
+            </a:r>
+          </a:p>
+          <a:p>
+            <a:pPr lvl="1"/>
+            <a:r>
+              <a:rPr lang="en-US" dirty="0"/>
+              <a:t>Kaggle has one of the largest collections of datasets</a:t>
+            </a:r>
+          </a:p>
+          <a:p>
+            <a:pPr lvl="1"/>
+            <a:r>
+              <a:rPr lang="en-US" dirty="0"/>
+              <a:t>Datasets span a wide variety of domains</a:t>
+            </a:r>
+          </a:p>
+          <a:p>
+            <a:r>
+              <a:rPr lang="en-US" dirty="0"/>
+              <a:t>Kernels</a:t>
+            </a:r>
+          </a:p>
+          <a:p>
+            <a:pPr lvl="1"/>
+            <a:r>
+              <a:rPr lang="en-US" dirty="0"/>
+              <a:t>Browse other people’s solutions and code for challenging data problems</a:t>
+            </a:r>
+          </a:p>
+          <a:p>
+            <a:r>
+              <a:rPr lang="en-US" dirty="0"/>
+              <a:t>Jobs</a:t>
+            </a:r>
+          </a:p>
+          <a:p>
+            <a:pPr lvl="1"/>
+            <a:r>
+              <a:rPr lang="en-US" dirty="0"/>
+              <a:t>Lots of companies post job openings on Kaggle</a:t>
+            </a:r>
+          </a:p>
+          <a:p>
+            <a:pPr lvl="1"/>
+            <a:r>
+              <a:rPr lang="en-US" dirty="0"/>
+              <a:t>Being active on Kaggle looks very good on resume for data positions</a:t>
+            </a:r>
+          </a:p>
+          <a:p>
+            <a:pPr lvl="1"/>
+            <a:endParaRPr lang="en-US" dirty="0"/>
+          </a:p>
+        </p:txBody>
+      </p:sp>
+    </p:spTree>
+    <p:extLst>
+      <p:ext uri="{BB962C8B-B14F-4D97-AF65-F5344CB8AC3E}">
+        <p14:creationId xmlns:p14="http://schemas.microsoft.com/office/powerpoint/2010/main" val="1721111981"/>
+      </p:ext>
+    </p:extLst>
+  </p:cSld>
+  <p:clrMapOvr>
+    <a:masterClrMapping/>
+  </p:clrMapOvr>
+</p:sld>
+</file>
+
+<file path=ppt/slides/slide12.xml><?xml version="1.0" encoding="utf-8"?>
+<p:sld xmlns:a="http://schemas.openxmlformats.org/drawingml/2006/main" xmlns:r="http://schemas.openxmlformats.org/officeDocument/2006/relationships" xmlns:p="http://schemas.openxmlformats.org/presentationml/2006/main">
+  <p:cSld>
+    <p:spTree>
+      <p:nvGrpSpPr>
+        <p:cNvPr id="1" name=""/>
+        <p:cNvGrpSpPr/>
+        <p:nvPr/>
+      </p:nvGrpSpPr>
+      <p:grpSpPr>
+        <a:xfrm>
+          <a:off x="0" y="0"/>
+          <a:ext cx="0" cy="0"/>
+          <a:chOff x="0" y="0"/>
+          <a:chExt cx="0" cy="0"/>
+        </a:xfrm>
+      </p:grpSpPr>
+      <p:sp>
+        <p:nvSpPr>
+          <p:cNvPr id="2" name="Title 1">
+            <a:extLst>
+              <a:ext uri="{FF2B5EF4-FFF2-40B4-BE49-F238E27FC236}">
+                <a16:creationId xmlns:a16="http://schemas.microsoft.com/office/drawing/2014/main" id="{09665CD7-15B7-45DD-A707-A40476B332BE}"/>
+              </a:ext>
+            </a:extLst>
+          </p:cNvPr>
+          <p:cNvSpPr>
+            <a:spLocks noGrp="1"/>
+          </p:cNvSpPr>
+          <p:nvPr>
+            <p:ph type="title"/>
+          </p:nvPr>
+        </p:nvSpPr>
+        <p:spPr/>
+        <p:txBody>
+          <a:bodyPr/>
+          <a:lstStyle/>
+          <a:p>
+            <a:r>
+              <a:rPr lang="en-US" dirty="0"/>
               <a:t>Additional Resources</a:t>
             </a:r>
           </a:p>

</xml_diff>